<commit_message>
Update ts obs presentation
</commit_message>
<xml_diff>
--- a/presentations/mf6-obs-timeseries.pptx
+++ b/presentations/mf6-obs-timeseries.pptx
@@ -5,10 +5,10 @@
     <p:sldMasterId id="2147483648" r:id="rId1"/>
   </p:sldMasterIdLst>
   <p:notesMasterIdLst>
-    <p:notesMasterId r:id="rId8"/>
+    <p:notesMasterId r:id="rId12"/>
   </p:notesMasterIdLst>
   <p:handoutMasterIdLst>
-    <p:handoutMasterId r:id="rId9"/>
+    <p:handoutMasterId r:id="rId13"/>
   </p:handoutMasterIdLst>
   <p:sldIdLst>
     <p:sldId id="565" r:id="rId2"/>
@@ -16,7 +16,11 @@
     <p:sldId id="714" r:id="rId4"/>
     <p:sldId id="717" r:id="rId5"/>
     <p:sldId id="552" r:id="rId6"/>
-    <p:sldId id="778" r:id="rId7"/>
+    <p:sldId id="780" r:id="rId7"/>
+    <p:sldId id="781" r:id="rId8"/>
+    <p:sldId id="783" r:id="rId9"/>
+    <p:sldId id="782" r:id="rId10"/>
+    <p:sldId id="778" r:id="rId11"/>
   </p:sldIdLst>
   <p:sldSz cx="9144000" cy="6858000" type="screen4x3"/>
   <p:notesSz cx="6950075" cy="9236075"/>
@@ -251,14 +255,14 @@
           <a:effectLst/>
           <a:extLst>
             <a:ext uri="{909E8E84-426E-40dd-AFC4-6F175D3DCCD1}">
-              <a14:hiddenFill xmlns:a14="http://schemas.microsoft.com/office/drawing/2010/main" xmlns="">
+              <a14:hiddenFill xmlns="" xmlns:a14="http://schemas.microsoft.com/office/drawing/2010/main">
                 <a:solidFill>
                   <a:schemeClr val="accent1"/>
                 </a:solidFill>
               </a14:hiddenFill>
             </a:ext>
             <a:ext uri="{91240B29-F687-4f45-9708-019B960494DF}">
-              <a14:hiddenLine xmlns:a14="http://schemas.microsoft.com/office/drawing/2010/main" xmlns="" w="12700">
+              <a14:hiddenLine xmlns="" xmlns:a14="http://schemas.microsoft.com/office/drawing/2010/main" w="12700">
                 <a:solidFill>
                   <a:schemeClr val="tx1"/>
                 </a:solidFill>
@@ -268,7 +272,7 @@
               </a14:hiddenLine>
             </a:ext>
             <a:ext uri="{AF507438-7753-43e0-B8FC-AC1667EBCBE1}">
-              <a14:hiddenEffects xmlns:a14="http://schemas.microsoft.com/office/drawing/2010/main" xmlns="">
+              <a14:hiddenEffects xmlns="" xmlns:a14="http://schemas.microsoft.com/office/drawing/2010/main">
                 <a:effectLst>
                   <a:outerShdw blurRad="63500" dist="38099" dir="2700000" algn="ctr" rotWithShape="0">
                     <a:schemeClr val="bg2">
@@ -279,7 +283,7 @@
               </a14:hiddenEffects>
             </a:ext>
             <a:ext uri="{FAA26D3D-D897-4be2-8F04-BA451C77F1D7}">
-              <ma14:placeholderFlag xmlns:ma14="http://schemas.microsoft.com/office/mac/drawingml/2011/main" xmlns="" val="1"/>
+              <ma14:placeholderFlag xmlns="" xmlns:ma14="http://schemas.microsoft.com/office/mac/drawingml/2011/main" val="1"/>
             </a:ext>
           </a:extLst>
         </p:spPr>
@@ -357,12 +361,12 @@
           <a:effectLst/>
           <a:extLst>
             <a:ext uri="{909E8E84-426E-40dd-AFC4-6F175D3DCCD1}">
-              <a14:hiddenFill xmlns:a14="http://schemas.microsoft.com/office/drawing/2010/main" xmlns="">
+              <a14:hiddenFill xmlns="" xmlns:a14="http://schemas.microsoft.com/office/drawing/2010/main">
                 <a:noFill/>
               </a14:hiddenFill>
             </a:ext>
             <a:ext uri="{AF507438-7753-43e0-B8FC-AC1667EBCBE1}">
-              <a14:hiddenEffects xmlns:a14="http://schemas.microsoft.com/office/drawing/2010/main" xmlns="">
+              <a14:hiddenEffects xmlns="" xmlns:a14="http://schemas.microsoft.com/office/drawing/2010/main">
                 <a:effectLst>
                   <a:outerShdw blurRad="63500" dist="38099" dir="2700000" algn="ctr" rotWithShape="0">
                     <a:srgbClr val="000000">
@@ -373,7 +377,7 @@
               </a14:hiddenEffects>
             </a:ext>
             <a:ext uri="{53640926-AAD7-44d8-BBD7-CCE9431645EC}">
-              <a14:shadowObscured xmlns:a14="http://schemas.microsoft.com/office/drawing/2010/main" xmlns="" val="1"/>
+              <a14:shadowObscured xmlns="" xmlns:a14="http://schemas.microsoft.com/office/drawing/2010/main" val="1"/>
             </a:ext>
           </a:extLst>
         </p:spPr>
@@ -551,14 +555,14 @@
           <a:effectLst/>
           <a:extLst>
             <a:ext uri="{909E8E84-426E-40dd-AFC4-6F175D3DCCD1}">
-              <a14:hiddenFill xmlns:a14="http://schemas.microsoft.com/office/drawing/2010/main" xmlns="">
+              <a14:hiddenFill xmlns="" xmlns:a14="http://schemas.microsoft.com/office/drawing/2010/main">
                 <a:solidFill>
                   <a:schemeClr val="accent1"/>
                 </a:solidFill>
               </a14:hiddenFill>
             </a:ext>
             <a:ext uri="{91240B29-F687-4f45-9708-019B960494DF}">
-              <a14:hiddenLine xmlns:a14="http://schemas.microsoft.com/office/drawing/2010/main" xmlns="" w="12700">
+              <a14:hiddenLine xmlns="" xmlns:a14="http://schemas.microsoft.com/office/drawing/2010/main" w="12700">
                 <a:solidFill>
                   <a:schemeClr val="tx1"/>
                 </a:solidFill>
@@ -568,7 +572,7 @@
               </a14:hiddenLine>
             </a:ext>
             <a:ext uri="{AF507438-7753-43e0-B8FC-AC1667EBCBE1}">
-              <a14:hiddenEffects xmlns:a14="http://schemas.microsoft.com/office/drawing/2010/main" xmlns="">
+              <a14:hiddenEffects xmlns="" xmlns:a14="http://schemas.microsoft.com/office/drawing/2010/main">
                 <a:effectLst>
                   <a:outerShdw blurRad="63500" dist="38099" dir="2700000" algn="ctr" rotWithShape="0">
                     <a:schemeClr val="bg2">
@@ -651,14 +655,14 @@
           </a:ln>
           <a:extLst>
             <a:ext uri="{909E8E84-426E-40dd-AFC4-6F175D3DCCD1}">
-              <a14:hiddenFill xmlns:a14="http://schemas.microsoft.com/office/drawing/2010/main" xmlns="">
+              <a14:hiddenFill xmlns="" xmlns:a14="http://schemas.microsoft.com/office/drawing/2010/main">
                 <a:solidFill>
                   <a:srgbClr val="FFFFFF"/>
                 </a:solidFill>
               </a14:hiddenFill>
             </a:ext>
             <a:ext uri="{91240B29-F687-4f45-9708-019B960494DF}">
-              <a14:hiddenLine xmlns:a14="http://schemas.microsoft.com/office/drawing/2010/main" xmlns="" w="9525">
+              <a14:hiddenLine xmlns="" xmlns:a14="http://schemas.microsoft.com/office/drawing/2010/main" w="9525">
                 <a:solidFill>
                   <a:srgbClr val="000000"/>
                 </a:solidFill>
@@ -2303,14 +2307,14 @@
           <a:effectLst/>
           <a:extLst>
             <a:ext uri="{909E8E84-426E-40dd-AFC4-6F175D3DCCD1}">
-              <a14:hiddenFill xmlns:a14="http://schemas.microsoft.com/office/drawing/2010/main" xmlns="">
+              <a14:hiddenFill xmlns="" xmlns:a14="http://schemas.microsoft.com/office/drawing/2010/main">
                 <a:solidFill>
                   <a:schemeClr val="accent1"/>
                 </a:solidFill>
               </a14:hiddenFill>
             </a:ext>
             <a:ext uri="{91240B29-F687-4f45-9708-019B960494DF}">
-              <a14:hiddenLine xmlns:a14="http://schemas.microsoft.com/office/drawing/2010/main" xmlns="" w="12700">
+              <a14:hiddenLine xmlns="" xmlns:a14="http://schemas.microsoft.com/office/drawing/2010/main" w="12700">
                 <a:solidFill>
                   <a:schemeClr val="tx1"/>
                 </a:solidFill>
@@ -2320,7 +2324,7 @@
               </a14:hiddenLine>
             </a:ext>
             <a:ext uri="{AF507438-7753-43e0-B8FC-AC1667EBCBE1}">
-              <a14:hiddenEffects xmlns:a14="http://schemas.microsoft.com/office/drawing/2010/main" xmlns="">
+              <a14:hiddenEffects xmlns="" xmlns:a14="http://schemas.microsoft.com/office/drawing/2010/main">
                 <a:effectLst>
                   <a:outerShdw blurRad="63500" dist="38099" dir="2700000" algn="ctr" rotWithShape="0">
                     <a:schemeClr val="bg2">
@@ -2331,7 +2335,7 @@
               </a14:hiddenEffects>
             </a:ext>
             <a:ext uri="{FAA26D3D-D897-4be2-8F04-BA451C77F1D7}">
-              <ma14:placeholderFlag xmlns:ma14="http://schemas.microsoft.com/office/mac/drawingml/2011/main" xmlns="" val="1"/>
+              <ma14:placeholderFlag xmlns="" xmlns:ma14="http://schemas.microsoft.com/office/mac/drawingml/2011/main" val="1"/>
             </a:ext>
           </a:extLst>
         </p:spPr>
@@ -2376,14 +2380,14 @@
           <a:effectLst/>
           <a:extLst>
             <a:ext uri="{909E8E84-426E-40dd-AFC4-6F175D3DCCD1}">
-              <a14:hiddenFill xmlns:a14="http://schemas.microsoft.com/office/drawing/2010/main" xmlns="">
+              <a14:hiddenFill xmlns="" xmlns:a14="http://schemas.microsoft.com/office/drawing/2010/main">
                 <a:solidFill>
                   <a:schemeClr val="accent1"/>
                 </a:solidFill>
               </a14:hiddenFill>
             </a:ext>
             <a:ext uri="{91240B29-F687-4f45-9708-019B960494DF}">
-              <a14:hiddenLine xmlns:a14="http://schemas.microsoft.com/office/drawing/2010/main" xmlns="" w="12700">
+              <a14:hiddenLine xmlns="" xmlns:a14="http://schemas.microsoft.com/office/drawing/2010/main" w="12700">
                 <a:solidFill>
                   <a:schemeClr val="tx1"/>
                 </a:solidFill>
@@ -2393,7 +2397,7 @@
               </a14:hiddenLine>
             </a:ext>
             <a:ext uri="{AF507438-7753-43e0-B8FC-AC1667EBCBE1}">
-              <a14:hiddenEffects xmlns:a14="http://schemas.microsoft.com/office/drawing/2010/main" xmlns="">
+              <a14:hiddenEffects xmlns="" xmlns:a14="http://schemas.microsoft.com/office/drawing/2010/main">
                 <a:effectLst>
                   <a:outerShdw blurRad="63500" dist="38099" dir="2700000" algn="ctr" rotWithShape="0">
                     <a:schemeClr val="bg2">
@@ -2404,7 +2408,7 @@
               </a14:hiddenEffects>
             </a:ext>
             <a:ext uri="{FAA26D3D-D897-4be2-8F04-BA451C77F1D7}">
-              <ma14:placeholderFlag xmlns:ma14="http://schemas.microsoft.com/office/mac/drawingml/2011/main" xmlns="" val="1"/>
+              <ma14:placeholderFlag xmlns="" xmlns:ma14="http://schemas.microsoft.com/office/mac/drawingml/2011/main" val="1"/>
             </a:ext>
           </a:extLst>
         </p:spPr>
@@ -2488,14 +2492,14 @@
           </a:ln>
           <a:extLst>
             <a:ext uri="{909E8E84-426E-40dd-AFC4-6F175D3DCCD1}">
-              <a14:hiddenFill xmlns:a14="http://schemas.microsoft.com/office/drawing/2010/main" xmlns="">
+              <a14:hiddenFill xmlns="" xmlns:a14="http://schemas.microsoft.com/office/drawing/2010/main">
                 <a:solidFill>
                   <a:srgbClr val="FFFFFF"/>
                 </a:solidFill>
               </a14:hiddenFill>
             </a:ext>
             <a:ext uri="{91240B29-F687-4f45-9708-019B960494DF}">
-              <a14:hiddenLine xmlns:a14="http://schemas.microsoft.com/office/drawing/2010/main" xmlns="" w="9525">
+              <a14:hiddenLine xmlns="" xmlns:a14="http://schemas.microsoft.com/office/drawing/2010/main" w="9525">
                 <a:solidFill>
                   <a:srgbClr val="000000"/>
                 </a:solidFill>
@@ -3068,6 +3072,168 @@
 </p:sld>
 </file>
 
+<file path=ppt/slides/slide10.xml><?xml version="1.0" encoding="utf-8"?>
+<p:sld xmlns:a="http://schemas.openxmlformats.org/drawingml/2006/main" xmlns:r="http://schemas.openxmlformats.org/officeDocument/2006/relationships" xmlns:p="http://schemas.openxmlformats.org/presentationml/2006/main">
+  <p:cSld>
+    <p:spTree>
+      <p:nvGrpSpPr>
+        <p:cNvPr id="1" name=""/>
+        <p:cNvGrpSpPr/>
+        <p:nvPr/>
+      </p:nvGrpSpPr>
+      <p:grpSpPr>
+        <a:xfrm>
+          <a:off x="0" y="0"/>
+          <a:ext cx="0" cy="0"/>
+          <a:chOff x="0" y="0"/>
+          <a:chExt cx="0" cy="0"/>
+        </a:xfrm>
+      </p:grpSpPr>
+      <p:pic>
+        <p:nvPicPr>
+          <p:cNvPr id="4" name="Picture 3"/>
+          <p:cNvPicPr>
+            <a:picLocks noChangeAspect="1"/>
+          </p:cNvPicPr>
+          <p:nvPr/>
+        </p:nvPicPr>
+        <p:blipFill>
+          <a:blip r:embed="rId2"/>
+          <a:stretch>
+            <a:fillRect/>
+          </a:stretch>
+        </p:blipFill>
+        <p:spPr>
+          <a:xfrm>
+            <a:off x="457200" y="1371600"/>
+            <a:ext cx="3059525" cy="5152516"/>
+          </a:xfrm>
+          <a:prstGeom prst="rect">
+            <a:avLst/>
+          </a:prstGeom>
+        </p:spPr>
+      </p:pic>
+      <p:sp>
+        <p:nvSpPr>
+          <p:cNvPr id="2" name="Title 1"/>
+          <p:cNvSpPr>
+            <a:spLocks noGrp="1"/>
+          </p:cNvSpPr>
+          <p:nvPr>
+            <p:ph type="title"/>
+          </p:nvPr>
+        </p:nvSpPr>
+        <p:spPr/>
+        <p:txBody>
+          <a:bodyPr/>
+          <a:lstStyle/>
+          <a:p>
+            <a:r>
+              <a:rPr lang="en-US" dirty="0"/>
+              <a:t>Observations</a:t>
+            </a:r>
+          </a:p>
+        </p:txBody>
+      </p:sp>
+      <p:pic>
+        <p:nvPicPr>
+          <p:cNvPr id="11" name="Picture 10"/>
+          <p:cNvPicPr>
+            <a:picLocks noChangeAspect="1"/>
+          </p:cNvPicPr>
+          <p:nvPr/>
+        </p:nvPicPr>
+        <p:blipFill>
+          <a:blip r:embed="rId3"/>
+          <a:stretch>
+            <a:fillRect/>
+          </a:stretch>
+        </p:blipFill>
+        <p:spPr>
+          <a:xfrm>
+            <a:off x="5105400" y="838200"/>
+            <a:ext cx="3218800" cy="2071788"/>
+          </a:xfrm>
+          <a:prstGeom prst="rect">
+            <a:avLst/>
+          </a:prstGeom>
+        </p:spPr>
+      </p:pic>
+      <p:sp>
+        <p:nvSpPr>
+          <p:cNvPr id="12" name="TextBox 11"/>
+          <p:cNvSpPr txBox="1"/>
+          <p:nvPr/>
+        </p:nvSpPr>
+        <p:spPr>
+          <a:xfrm>
+            <a:off x="5638800" y="457200"/>
+            <a:ext cx="2209083" cy="400110"/>
+          </a:xfrm>
+          <a:prstGeom prst="rect">
+            <a:avLst/>
+          </a:prstGeom>
+          <a:noFill/>
+        </p:spPr>
+        <p:txBody>
+          <a:bodyPr wrap="none" rtlCol="0">
+            <a:spAutoFit/>
+          </a:bodyPr>
+          <a:lstStyle/>
+          <a:p>
+            <a:r>
+              <a:rPr lang="en-US" sz="2000" dirty="0" err="1">
+                <a:solidFill>
+                  <a:schemeClr val="bg1"/>
+                </a:solidFill>
+              </a:rPr>
+              <a:t>mymodel.ghb.obs</a:t>
+            </a:r>
+            <a:endParaRPr lang="en-US" sz="2000" dirty="0">
+              <a:solidFill>
+                <a:schemeClr val="bg1"/>
+              </a:solidFill>
+            </a:endParaRPr>
+          </a:p>
+        </p:txBody>
+      </p:sp>
+      <p:pic>
+        <p:nvPicPr>
+          <p:cNvPr id="13" name="Picture 12"/>
+          <p:cNvPicPr>
+            <a:picLocks noChangeAspect="1"/>
+          </p:cNvPicPr>
+          <p:nvPr/>
+        </p:nvPicPr>
+        <p:blipFill>
+          <a:blip r:embed="rId4"/>
+          <a:stretch>
+            <a:fillRect/>
+          </a:stretch>
+        </p:blipFill>
+        <p:spPr>
+          <a:xfrm>
+            <a:off x="5105400" y="3505200"/>
+            <a:ext cx="3369345" cy="2724151"/>
+          </a:xfrm>
+          <a:prstGeom prst="rect">
+            <a:avLst/>
+          </a:prstGeom>
+        </p:spPr>
+      </p:pic>
+    </p:spTree>
+    <p:extLst>
+      <p:ext uri="{BB962C8B-B14F-4D97-AF65-F5344CB8AC3E}">
+        <p14:creationId xmlns:p14="http://schemas.microsoft.com/office/powerpoint/2010/main" val="2503673921"/>
+      </p:ext>
+    </p:extLst>
+  </p:cSld>
+  <p:clrMapOvr>
+    <a:masterClrMapping/>
+  </p:clrMapOvr>
+</p:sld>
+</file>
+
 <file path=ppt/slides/slide2.xml><?xml version="1.0" encoding="utf-8"?>
 <p:sld xmlns:a="http://schemas.openxmlformats.org/drawingml/2006/main" xmlns:r="http://schemas.openxmlformats.org/officeDocument/2006/relationships" xmlns:p="http://schemas.openxmlformats.org/presentationml/2006/main">
   <p:cSld>
@@ -3115,7 +3281,7 @@
           </a:ln>
           <a:extLst>
             <a:ext uri="{91240B29-F687-4f45-9708-019B960494DF}">
-              <a14:hiddenLine xmlns:a14="http://schemas.microsoft.com/office/drawing/2010/main" xmlns="" w="9525">
+              <a14:hiddenLine xmlns="" xmlns:a14="http://schemas.microsoft.com/office/drawing/2010/main" w="9525">
                 <a:solidFill>
                   <a:srgbClr val="000000"/>
                 </a:solidFill>
@@ -3255,7 +3421,7 @@
           </a:ln>
           <a:extLst>
             <a:ext uri="{91240B29-F687-4f45-9708-019B960494DF}">
-              <a14:hiddenLine xmlns:a14="http://schemas.microsoft.com/office/drawing/2010/main" xmlns="" w="9525">
+              <a14:hiddenLine xmlns="" xmlns:a14="http://schemas.microsoft.com/office/drawing/2010/main" w="9525">
                 <a:solidFill>
                   <a:srgbClr val="000000"/>
                 </a:solidFill>
@@ -3902,9 +4068,43 @@
           <a:chExt cx="0" cy="0"/>
         </a:xfrm>
       </p:grpSpPr>
+      <p:sp>
+        <p:nvSpPr>
+          <p:cNvPr id="2" name="Title 1">
+            <a:extLst>
+              <a:ext uri="{FF2B5EF4-FFF2-40B4-BE49-F238E27FC236}">
+                <a16:creationId xmlns:a16="http://schemas.microsoft.com/office/drawing/2014/main" id="{D82BCF33-ECC2-374B-9DF5-2E8BA870901D}"/>
+              </a:ext>
+            </a:extLst>
+          </p:cNvPr>
+          <p:cNvSpPr>
+            <a:spLocks noGrp="1"/>
+          </p:cNvSpPr>
+          <p:nvPr>
+            <p:ph type="title"/>
+          </p:nvPr>
+        </p:nvSpPr>
+        <p:spPr/>
+        <p:txBody>
+          <a:bodyPr/>
+          <a:lstStyle/>
+          <a:p>
+            <a:r>
+              <a:rPr lang="en-US" dirty="0"/>
+              <a:t>Observations</a:t>
+            </a:r>
+          </a:p>
+        </p:txBody>
+      </p:sp>
       <p:pic>
         <p:nvPicPr>
-          <p:cNvPr id="4" name="Picture 3"/>
+          <p:cNvPr id="3" name="Picture 2">
+            <a:extLst>
+              <a:ext uri="{FF2B5EF4-FFF2-40B4-BE49-F238E27FC236}">
+                <a16:creationId xmlns:a16="http://schemas.microsoft.com/office/drawing/2014/main" id="{B61253C7-3087-2E4E-B93F-94125C1C5DD5}"/>
+              </a:ext>
+            </a:extLst>
+          </p:cNvPr>
           <p:cNvPicPr>
             <a:picLocks noChangeAspect="1"/>
           </p:cNvPicPr>
@@ -3918,17 +4118,53 @@
         </p:blipFill>
         <p:spPr>
           <a:xfrm>
-            <a:off x="457200" y="1371600"/>
-            <a:ext cx="3059525" cy="5152516"/>
+            <a:off x="0" y="1219200"/>
+            <a:ext cx="9144000" cy="2730151"/>
           </a:xfrm>
           <a:prstGeom prst="rect">
             <a:avLst/>
           </a:prstGeom>
         </p:spPr>
       </p:pic>
+    </p:spTree>
+    <p:extLst>
+      <p:ext uri="{BB962C8B-B14F-4D97-AF65-F5344CB8AC3E}">
+        <p14:creationId xmlns:p14="http://schemas.microsoft.com/office/powerpoint/2010/main" val="2683493847"/>
+      </p:ext>
+    </p:extLst>
+  </p:cSld>
+  <p:clrMapOvr>
+    <a:masterClrMapping/>
+  </p:clrMapOvr>
+</p:sld>
+</file>
+
+<file path=ppt/slides/slide7.xml><?xml version="1.0" encoding="utf-8"?>
+<p:sld xmlns:a="http://schemas.openxmlformats.org/drawingml/2006/main" xmlns:r="http://schemas.openxmlformats.org/officeDocument/2006/relationships" xmlns:p="http://schemas.openxmlformats.org/presentationml/2006/main">
+  <p:cSld>
+    <p:spTree>
+      <p:nvGrpSpPr>
+        <p:cNvPr id="1" name=""/>
+        <p:cNvGrpSpPr/>
+        <p:nvPr/>
+      </p:nvGrpSpPr>
+      <p:grpSpPr>
+        <a:xfrm>
+          <a:off x="0" y="0"/>
+          <a:ext cx="0" cy="0"/>
+          <a:chOff x="0" y="0"/>
+          <a:chExt cx="0" cy="0"/>
+        </a:xfrm>
+      </p:grpSpPr>
       <p:sp>
         <p:nvSpPr>
-          <p:cNvPr id="2" name="Title 1"/>
+          <p:cNvPr id="2" name="Title 1">
+            <a:extLst>
+              <a:ext uri="{FF2B5EF4-FFF2-40B4-BE49-F238E27FC236}">
+                <a16:creationId xmlns:a16="http://schemas.microsoft.com/office/drawing/2014/main" id="{D82BCF33-ECC2-374B-9DF5-2E8BA870901D}"/>
+              </a:ext>
+            </a:extLst>
+          </p:cNvPr>
           <p:cNvSpPr>
             <a:spLocks noGrp="1"/>
           </p:cNvSpPr>
@@ -3950,7 +4186,131 @@
       </p:sp>
       <p:pic>
         <p:nvPicPr>
-          <p:cNvPr id="11" name="Picture 10"/>
+          <p:cNvPr id="5" name="Picture 4">
+            <a:extLst>
+              <a:ext uri="{FF2B5EF4-FFF2-40B4-BE49-F238E27FC236}">
+                <a16:creationId xmlns:a16="http://schemas.microsoft.com/office/drawing/2014/main" id="{3193E8F3-3449-6E45-B4B6-8DBEE8FDE8E0}"/>
+              </a:ext>
+            </a:extLst>
+          </p:cNvPr>
+          <p:cNvPicPr>
+            <a:picLocks noChangeAspect="1"/>
+          </p:cNvPicPr>
+          <p:nvPr/>
+        </p:nvPicPr>
+        <p:blipFill>
+          <a:blip r:embed="rId2"/>
+          <a:stretch>
+            <a:fillRect/>
+          </a:stretch>
+        </p:blipFill>
+        <p:spPr>
+          <a:xfrm>
+            <a:off x="762000" y="1091764"/>
+            <a:ext cx="7620000" cy="4851836"/>
+          </a:xfrm>
+          <a:prstGeom prst="rect">
+            <a:avLst/>
+          </a:prstGeom>
+        </p:spPr>
+      </p:pic>
+    </p:spTree>
+    <p:extLst>
+      <p:ext uri="{BB962C8B-B14F-4D97-AF65-F5344CB8AC3E}">
+        <p14:creationId xmlns:p14="http://schemas.microsoft.com/office/powerpoint/2010/main" val="2947463276"/>
+      </p:ext>
+    </p:extLst>
+  </p:cSld>
+  <p:clrMapOvr>
+    <a:masterClrMapping/>
+  </p:clrMapOvr>
+</p:sld>
+</file>
+
+<file path=ppt/slides/slide8.xml><?xml version="1.0" encoding="utf-8"?>
+<p:sld xmlns:a="http://schemas.openxmlformats.org/drawingml/2006/main" xmlns:r="http://schemas.openxmlformats.org/officeDocument/2006/relationships" xmlns:p="http://schemas.openxmlformats.org/presentationml/2006/main">
+  <p:cSld>
+    <p:spTree>
+      <p:nvGrpSpPr>
+        <p:cNvPr id="1" name=""/>
+        <p:cNvGrpSpPr/>
+        <p:nvPr/>
+      </p:nvGrpSpPr>
+      <p:grpSpPr>
+        <a:xfrm>
+          <a:off x="0" y="0"/>
+          <a:ext cx="0" cy="0"/>
+          <a:chOff x="0" y="0"/>
+          <a:chExt cx="0" cy="0"/>
+        </a:xfrm>
+      </p:grpSpPr>
+      <p:sp>
+        <p:nvSpPr>
+          <p:cNvPr id="2" name="Title 1">
+            <a:extLst>
+              <a:ext uri="{FF2B5EF4-FFF2-40B4-BE49-F238E27FC236}">
+                <a16:creationId xmlns:a16="http://schemas.microsoft.com/office/drawing/2014/main" id="{D82BCF33-ECC2-374B-9DF5-2E8BA870901D}"/>
+              </a:ext>
+            </a:extLst>
+          </p:cNvPr>
+          <p:cNvSpPr>
+            <a:spLocks noGrp="1"/>
+          </p:cNvSpPr>
+          <p:nvPr>
+            <p:ph type="title"/>
+          </p:nvPr>
+        </p:nvSpPr>
+        <p:spPr/>
+        <p:txBody>
+          <a:bodyPr/>
+          <a:lstStyle/>
+          <a:p>
+            <a:r>
+              <a:rPr lang="en-US" dirty="0"/>
+              <a:t>Observations</a:t>
+            </a:r>
+          </a:p>
+        </p:txBody>
+      </p:sp>
+      <p:pic>
+        <p:nvPicPr>
+          <p:cNvPr id="3" name="Picture 2">
+            <a:extLst>
+              <a:ext uri="{FF2B5EF4-FFF2-40B4-BE49-F238E27FC236}">
+                <a16:creationId xmlns:a16="http://schemas.microsoft.com/office/drawing/2014/main" id="{1E591F68-53B0-D547-A2A8-BD8658065D3F}"/>
+              </a:ext>
+            </a:extLst>
+          </p:cNvPr>
+          <p:cNvPicPr>
+            <a:picLocks noChangeAspect="1"/>
+          </p:cNvPicPr>
+          <p:nvPr/>
+        </p:nvPicPr>
+        <p:blipFill>
+          <a:blip r:embed="rId2"/>
+          <a:stretch>
+            <a:fillRect/>
+          </a:stretch>
+        </p:blipFill>
+        <p:spPr>
+          <a:xfrm>
+            <a:off x="228600" y="1260438"/>
+            <a:ext cx="4191000" cy="1974181"/>
+          </a:xfrm>
+          <a:prstGeom prst="rect">
+            <a:avLst/>
+          </a:prstGeom>
+        </p:spPr>
+      </p:pic>
+      <p:pic>
+        <p:nvPicPr>
+          <p:cNvPr id="4" name="Picture 3">
+            <a:extLst>
+              <a:ext uri="{FF2B5EF4-FFF2-40B4-BE49-F238E27FC236}">
+                <a16:creationId xmlns:a16="http://schemas.microsoft.com/office/drawing/2014/main" id="{7F234973-9F73-624D-963C-E1B2A409C96C}"/>
+              </a:ext>
+            </a:extLst>
+          </p:cNvPr>
           <p:cNvPicPr>
             <a:picLocks noChangeAspect="1"/>
           </p:cNvPicPr>
@@ -3964,70 +4324,8 @@
         </p:blipFill>
         <p:spPr>
           <a:xfrm>
-            <a:off x="5105400" y="838200"/>
-            <a:ext cx="3218800" cy="2071788"/>
-          </a:xfrm>
-          <a:prstGeom prst="rect">
-            <a:avLst/>
-          </a:prstGeom>
-        </p:spPr>
-      </p:pic>
-      <p:sp>
-        <p:nvSpPr>
-          <p:cNvPr id="12" name="TextBox 11"/>
-          <p:cNvSpPr txBox="1"/>
-          <p:nvPr/>
-        </p:nvSpPr>
-        <p:spPr>
-          <a:xfrm>
-            <a:off x="5638800" y="457200"/>
-            <a:ext cx="2209083" cy="400110"/>
-          </a:xfrm>
-          <a:prstGeom prst="rect">
-            <a:avLst/>
-          </a:prstGeom>
-          <a:noFill/>
-        </p:spPr>
-        <p:txBody>
-          <a:bodyPr wrap="none" rtlCol="0">
-            <a:spAutoFit/>
-          </a:bodyPr>
-          <a:lstStyle/>
-          <a:p>
-            <a:r>
-              <a:rPr lang="en-US" sz="2000" dirty="0" err="1">
-                <a:solidFill>
-                  <a:schemeClr val="bg1"/>
-                </a:solidFill>
-              </a:rPr>
-              <a:t>mymodel.ghb.obs</a:t>
-            </a:r>
-            <a:endParaRPr lang="en-US" sz="2000" dirty="0">
-              <a:solidFill>
-                <a:schemeClr val="bg1"/>
-              </a:solidFill>
-            </a:endParaRPr>
-          </a:p>
-        </p:txBody>
-      </p:sp>
-      <p:pic>
-        <p:nvPicPr>
-          <p:cNvPr id="13" name="Picture 12"/>
-          <p:cNvPicPr>
-            <a:picLocks noChangeAspect="1"/>
-          </p:cNvPicPr>
-          <p:nvPr/>
-        </p:nvPicPr>
-        <p:blipFill>
-          <a:blip r:embed="rId4"/>
-          <a:stretch>
-            <a:fillRect/>
-          </a:stretch>
-        </p:blipFill>
-        <p:spPr>
-          <a:xfrm>
-            <a:off x="5105400" y="3505200"/>
-            <a:ext cx="3369345" cy="2724151"/>
+            <a:off x="4717678" y="1252370"/>
+            <a:ext cx="4191000" cy="3408973"/>
           </a:xfrm>
           <a:prstGeom prst="rect">
             <a:avLst/>
@@ -4037,7 +4335,95 @@
     </p:spTree>
     <p:extLst>
       <p:ext uri="{BB962C8B-B14F-4D97-AF65-F5344CB8AC3E}">
-        <p14:creationId xmlns:p14="http://schemas.microsoft.com/office/powerpoint/2010/main" val="2503673921"/>
+        <p14:creationId xmlns:p14="http://schemas.microsoft.com/office/powerpoint/2010/main" val="1685245629"/>
+      </p:ext>
+    </p:extLst>
+  </p:cSld>
+  <p:clrMapOvr>
+    <a:masterClrMapping/>
+  </p:clrMapOvr>
+</p:sld>
+</file>
+
+<file path=ppt/slides/slide9.xml><?xml version="1.0" encoding="utf-8"?>
+<p:sld xmlns:a="http://schemas.openxmlformats.org/drawingml/2006/main" xmlns:r="http://schemas.openxmlformats.org/officeDocument/2006/relationships" xmlns:p="http://schemas.openxmlformats.org/presentationml/2006/main">
+  <p:cSld>
+    <p:spTree>
+      <p:nvGrpSpPr>
+        <p:cNvPr id="1" name=""/>
+        <p:cNvGrpSpPr/>
+        <p:nvPr/>
+      </p:nvGrpSpPr>
+      <p:grpSpPr>
+        <a:xfrm>
+          <a:off x="0" y="0"/>
+          <a:ext cx="0" cy="0"/>
+          <a:chOff x="0" y="0"/>
+          <a:chExt cx="0" cy="0"/>
+        </a:xfrm>
+      </p:grpSpPr>
+      <p:sp>
+        <p:nvSpPr>
+          <p:cNvPr id="2" name="Title 1">
+            <a:extLst>
+              <a:ext uri="{FF2B5EF4-FFF2-40B4-BE49-F238E27FC236}">
+                <a16:creationId xmlns:a16="http://schemas.microsoft.com/office/drawing/2014/main" id="{D82BCF33-ECC2-374B-9DF5-2E8BA870901D}"/>
+              </a:ext>
+            </a:extLst>
+          </p:cNvPr>
+          <p:cNvSpPr>
+            <a:spLocks noGrp="1"/>
+          </p:cNvSpPr>
+          <p:nvPr>
+            <p:ph type="title"/>
+          </p:nvPr>
+        </p:nvSpPr>
+        <p:spPr/>
+        <p:txBody>
+          <a:bodyPr/>
+          <a:lstStyle/>
+          <a:p>
+            <a:r>
+              <a:rPr lang="en-US" dirty="0"/>
+              <a:t>Observations</a:t>
+            </a:r>
+          </a:p>
+        </p:txBody>
+      </p:sp>
+      <p:pic>
+        <p:nvPicPr>
+          <p:cNvPr id="3" name="Picture 2">
+            <a:extLst>
+              <a:ext uri="{FF2B5EF4-FFF2-40B4-BE49-F238E27FC236}">
+                <a16:creationId xmlns:a16="http://schemas.microsoft.com/office/drawing/2014/main" id="{FC84CC64-1D9C-BB40-A8E6-E88AFC24C13E}"/>
+              </a:ext>
+            </a:extLst>
+          </p:cNvPr>
+          <p:cNvPicPr>
+            <a:picLocks noChangeAspect="1"/>
+          </p:cNvPicPr>
+          <p:nvPr/>
+        </p:nvPicPr>
+        <p:blipFill>
+          <a:blip r:embed="rId2"/>
+          <a:stretch>
+            <a:fillRect/>
+          </a:stretch>
+        </p:blipFill>
+        <p:spPr>
+          <a:xfrm>
+            <a:off x="2328355" y="1219200"/>
+            <a:ext cx="4487289" cy="5029200"/>
+          </a:xfrm>
+          <a:prstGeom prst="rect">
+            <a:avLst/>
+          </a:prstGeom>
+        </p:spPr>
+      </p:pic>
+    </p:spTree>
+    <p:extLst>
+      <p:ext uri="{BB962C8B-B14F-4D97-AF65-F5344CB8AC3E}">
+        <p14:creationId xmlns:p14="http://schemas.microsoft.com/office/powerpoint/2010/main" val="1726001205"/>
       </p:ext>
     </p:extLst>
   </p:cSld>
@@ -4293,7 +4679,7 @@
         <a:effectLst/>
         <a:extLst>
           <a:ext uri="{AF507438-7753-43e0-B8FC-AC1667EBCBE1}">
-            <a14:hiddenEffects xmlns:a14="http://schemas.microsoft.com/office/drawing/2010/main" xmlns="">
+            <a14:hiddenEffects xmlns="" xmlns:a14="http://schemas.microsoft.com/office/drawing/2010/main">
               <a:effectLst>
                 <a:outerShdw blurRad="63500" dist="38099" dir="2700000" algn="ctr" rotWithShape="0">
                   <a:schemeClr val="bg2">
@@ -4369,7 +4755,7 @@
         <a:effectLst/>
         <a:extLst>
           <a:ext uri="{AF507438-7753-43e0-B8FC-AC1667EBCBE1}">
-            <a14:hiddenEffects xmlns:a14="http://schemas.microsoft.com/office/drawing/2010/main" xmlns="">
+            <a14:hiddenEffects xmlns="" xmlns:a14="http://schemas.microsoft.com/office/drawing/2010/main">
               <a:effectLst>
                 <a:outerShdw blurRad="63500" dist="38099" dir="2700000" algn="ctr" rotWithShape="0">
                   <a:schemeClr val="bg2">

</xml_diff>